<commit_message>
adding creepy cartoon and attempting to format text
</commit_message>
<xml_diff>
--- a/edoclogo.pptx
+++ b/edoclogo.pptx
@@ -291,7 +291,7 @@
           <a:p>
             <a:fld id="{465063E6-981F-114E-9666-CAF425975212}" type="datetimeFigureOut">
               <a:rPr lang="en-US" smtClean="0"/>
-              <a:t>06/11/18</a:t>
+              <a:t>08/11/18</a:t>
             </a:fld>
             <a:endParaRPr lang="en-US"/>
           </a:p>
@@ -461,7 +461,7 @@
           <a:p>
             <a:fld id="{465063E6-981F-114E-9666-CAF425975212}" type="datetimeFigureOut">
               <a:rPr lang="en-US" smtClean="0"/>
-              <a:t>06/11/18</a:t>
+              <a:t>08/11/18</a:t>
             </a:fld>
             <a:endParaRPr lang="en-US"/>
           </a:p>
@@ -641,7 +641,7 @@
           <a:p>
             <a:fld id="{465063E6-981F-114E-9666-CAF425975212}" type="datetimeFigureOut">
               <a:rPr lang="en-US" smtClean="0"/>
-              <a:t>06/11/18</a:t>
+              <a:t>08/11/18</a:t>
             </a:fld>
             <a:endParaRPr lang="en-US"/>
           </a:p>
@@ -811,7 +811,7 @@
           <a:p>
             <a:fld id="{465063E6-981F-114E-9666-CAF425975212}" type="datetimeFigureOut">
               <a:rPr lang="en-US" smtClean="0"/>
-              <a:t>06/11/18</a:t>
+              <a:t>08/11/18</a:t>
             </a:fld>
             <a:endParaRPr lang="en-US"/>
           </a:p>
@@ -1057,7 +1057,7 @@
           <a:p>
             <a:fld id="{465063E6-981F-114E-9666-CAF425975212}" type="datetimeFigureOut">
               <a:rPr lang="en-US" smtClean="0"/>
-              <a:t>06/11/18</a:t>
+              <a:t>08/11/18</a:t>
             </a:fld>
             <a:endParaRPr lang="en-US"/>
           </a:p>
@@ -1345,7 +1345,7 @@
           <a:p>
             <a:fld id="{465063E6-981F-114E-9666-CAF425975212}" type="datetimeFigureOut">
               <a:rPr lang="en-US" smtClean="0"/>
-              <a:t>06/11/18</a:t>
+              <a:t>08/11/18</a:t>
             </a:fld>
             <a:endParaRPr lang="en-US"/>
           </a:p>
@@ -1767,7 +1767,7 @@
           <a:p>
             <a:fld id="{465063E6-981F-114E-9666-CAF425975212}" type="datetimeFigureOut">
               <a:rPr lang="en-US" smtClean="0"/>
-              <a:t>06/11/18</a:t>
+              <a:t>08/11/18</a:t>
             </a:fld>
             <a:endParaRPr lang="en-US"/>
           </a:p>
@@ -1885,7 +1885,7 @@
           <a:p>
             <a:fld id="{465063E6-981F-114E-9666-CAF425975212}" type="datetimeFigureOut">
               <a:rPr lang="en-US" smtClean="0"/>
-              <a:t>06/11/18</a:t>
+              <a:t>08/11/18</a:t>
             </a:fld>
             <a:endParaRPr lang="en-US"/>
           </a:p>
@@ -1980,7 +1980,7 @@
           <a:p>
             <a:fld id="{465063E6-981F-114E-9666-CAF425975212}" type="datetimeFigureOut">
               <a:rPr lang="en-US" smtClean="0"/>
-              <a:t>06/11/18</a:t>
+              <a:t>08/11/18</a:t>
             </a:fld>
             <a:endParaRPr lang="en-US"/>
           </a:p>
@@ -2257,7 +2257,7 @@
           <a:p>
             <a:fld id="{465063E6-981F-114E-9666-CAF425975212}" type="datetimeFigureOut">
               <a:rPr lang="en-US" smtClean="0"/>
-              <a:t>06/11/18</a:t>
+              <a:t>08/11/18</a:t>
             </a:fld>
             <a:endParaRPr lang="en-US"/>
           </a:p>
@@ -2510,7 +2510,7 @@
           <a:p>
             <a:fld id="{465063E6-981F-114E-9666-CAF425975212}" type="datetimeFigureOut">
               <a:rPr lang="en-US" smtClean="0"/>
-              <a:t>06/11/18</a:t>
+              <a:t>08/11/18</a:t>
             </a:fld>
             <a:endParaRPr lang="en-US"/>
           </a:p>
@@ -2723,7 +2723,7 @@
           <a:p>
             <a:fld id="{465063E6-981F-114E-9666-CAF425975212}" type="datetimeFigureOut">
               <a:rPr lang="en-US" smtClean="0"/>
-              <a:t>06/11/18</a:t>
+              <a:t>08/11/18</a:t>
             </a:fld>
             <a:endParaRPr lang="en-US"/>
           </a:p>
@@ -3218,193 +3218,6 @@
           <a:chExt cx="0" cy="0"/>
         </a:xfrm>
       </p:grpSpPr>
-      <p:sp>
-        <p:nvSpPr>
-          <p:cNvPr id="2" name="Title 1"/>
-          <p:cNvSpPr>
-            <a:spLocks noGrp="1"/>
-          </p:cNvSpPr>
-          <p:nvPr>
-            <p:ph type="title"/>
-          </p:nvPr>
-        </p:nvSpPr>
-        <p:spPr>
-          <a:xfrm>
-            <a:off x="391164" y="1045097"/>
-            <a:ext cx="8229600" cy="4893088"/>
-          </a:xfrm>
-          <a:scene3d>
-            <a:camera prst="orthographicFront">
-              <a:rot lat="0" lon="0" rev="0"/>
-            </a:camera>
-            <a:lightRig rig="threePt" dir="t"/>
-          </a:scene3d>
-          <a:sp3d>
-            <a:bevelT w="254000" h="254000" prst="coolSlant"/>
-          </a:sp3d>
-        </p:spPr>
-        <p:txBody>
-          <a:bodyPr>
-            <a:prstTxWarp prst="textArchUp">
-              <a:avLst>
-                <a:gd name="adj" fmla="val 7504620"/>
-              </a:avLst>
-            </a:prstTxWarp>
-            <a:normAutofit/>
-          </a:bodyPr>
-          <a:lstStyle/>
-          <a:p>
-            <a:r>
-              <a:rPr lang="en-US" sz="9600" b="1" dirty="0">
-                <a:ln w="57150" cmpd="sng">
-                  <a:solidFill>
-                    <a:srgbClr val="000090"/>
-                  </a:solidFill>
-                  <a:prstDash val="solid"/>
-                </a:ln>
-                <a:solidFill>
-                  <a:srgbClr val="FFFFFF"/>
-                </a:solidFill>
-                <a:effectLst>
-                  <a:outerShdw blurRad="41275" dist="12700" dir="12000000" algn="tl" rotWithShape="0">
-                    <a:srgbClr val="000000">
-                      <a:alpha val="40000"/>
-                    </a:srgbClr>
-                  </a:outerShdw>
-                </a:effectLst>
-                <a:latin typeface="American Typewriter"/>
-                <a:cs typeface="American Typewriter"/>
-              </a:rPr>
-              <a:t>e</a:t>
-            </a:r>
-            <a:r>
-              <a:rPr lang="en-US" sz="9600" b="1" dirty="0" smtClean="0">
-                <a:ln w="57150" cmpd="sng">
-                  <a:solidFill>
-                    <a:srgbClr val="000090"/>
-                  </a:solidFill>
-                  <a:prstDash val="solid"/>
-                </a:ln>
-                <a:solidFill>
-                  <a:srgbClr val="FFFFFF"/>
-                </a:solidFill>
-                <a:effectLst>
-                  <a:outerShdw blurRad="41275" dist="12700" dir="12000000" algn="tl" rotWithShape="0">
-                    <a:srgbClr val="000000">
-                      <a:alpha val="40000"/>
-                    </a:srgbClr>
-                  </a:outerShdw>
-                </a:effectLst>
-                <a:latin typeface="American Typewriter"/>
-                <a:cs typeface="American Typewriter"/>
-              </a:rPr>
-              <a:t> D o c </a:t>
-            </a:r>
-            <a:r>
-              <a:rPr lang="en-US" sz="9600" b="1" dirty="0" smtClean="0">
-                <a:ln w="76200" cmpd="sng">
-                  <a:noFill/>
-                  <a:prstDash val="sysDash"/>
-                </a:ln>
-                <a:solidFill>
-                  <a:srgbClr val="FFFFFF"/>
-                </a:solidFill>
-                <a:effectLst>
-                  <a:glow rad="101600">
-                    <a:srgbClr val="3366FF">
-                      <a:alpha val="18000"/>
-                    </a:srgbClr>
-                  </a:glow>
-                </a:effectLst>
-                <a:latin typeface="American Typewriter"/>
-                <a:cs typeface="American Typewriter"/>
-              </a:rPr>
-              <a:t>o </a:t>
-            </a:r>
-            <a:r>
-              <a:rPr lang="en-US" sz="9600" b="1" dirty="0" smtClean="0">
-                <a:ln w="76200" cmpd="sng">
-                  <a:noFill/>
-                  <a:prstDash val="sysDash"/>
-                </a:ln>
-                <a:solidFill>
-                  <a:srgbClr val="FFFFFF"/>
-                </a:solidFill>
-                <a:effectLst>
-                  <a:glow rad="101600">
-                    <a:srgbClr val="3366FF">
-                      <a:alpha val="18000"/>
-                    </a:srgbClr>
-                  </a:glow>
-                </a:effectLst>
-                <a:latin typeface="American Typewriter"/>
-                <a:cs typeface="American Typewriter"/>
-              </a:rPr>
-              <a:t>  </a:t>
-            </a:r>
-            <a:r>
-              <a:rPr lang="en-US" sz="9600" b="1" dirty="0" smtClean="0">
-                <a:ln w="76200" cmpd="sng">
-                  <a:noFill/>
-                  <a:prstDash val="sysDash"/>
-                </a:ln>
-                <a:solidFill>
-                  <a:srgbClr val="FFFFFF"/>
-                </a:solidFill>
-                <a:effectLst>
-                  <a:glow rad="101600">
-                    <a:srgbClr val="3366FF">
-                      <a:alpha val="18000"/>
-                    </a:srgbClr>
-                  </a:glow>
-                </a:effectLst>
-                <a:latin typeface="American Typewriter"/>
-                <a:cs typeface="American Typewriter"/>
-              </a:rPr>
-              <a:t>  </a:t>
-            </a:r>
-            <a:r>
-              <a:rPr lang="en-US" sz="9600" b="1" dirty="0" smtClean="0">
-                <a:ln w="76200" cmpd="sng">
-                  <a:noFill/>
-                  <a:prstDash val="sysDash"/>
-                </a:ln>
-                <a:solidFill>
-                  <a:srgbClr val="FFFFFF"/>
-                </a:solidFill>
-                <a:effectLst>
-                  <a:glow rad="101600">
-                    <a:srgbClr val="3366FF">
-                      <a:alpha val="18000"/>
-                    </a:srgbClr>
-                  </a:glow>
-                </a:effectLst>
-                <a:latin typeface="American Typewriter"/>
-                <a:cs typeface="American Typewriter"/>
-              </a:rPr>
-              <a:t>e</a:t>
-            </a:r>
-            <a:endParaRPr lang="en-US" sz="9600" b="1" dirty="0">
-              <a:ln w="76200" cmpd="sng">
-                <a:noFill/>
-                <a:prstDash val="sysDash"/>
-              </a:ln>
-              <a:solidFill>
-                <a:srgbClr val="FFFFFF"/>
-              </a:solidFill>
-              <a:effectLst>
-                <a:glow rad="101600">
-                  <a:srgbClr val="3366FF">
-                    <a:alpha val="18000"/>
-                  </a:srgbClr>
-                </a:glow>
-              </a:effectLst>
-              <a:latin typeface="American Typewriter"/>
-              <a:cs typeface="American Typewriter"/>
-            </a:endParaRPr>
-          </a:p>
-        </p:txBody>
-      </p:sp>
       <p:grpSp>
         <p:nvGrpSpPr>
           <p:cNvPr id="10" name="Group 9"/>
@@ -3723,6 +3536,131 @@
           </p:txBody>
         </p:sp>
       </p:grpSp>
+      <p:sp>
+        <p:nvSpPr>
+          <p:cNvPr id="2" name="Title 1"/>
+          <p:cNvSpPr>
+            <a:spLocks noGrp="1"/>
+          </p:cNvSpPr>
+          <p:nvPr>
+            <p:ph type="title"/>
+          </p:nvPr>
+        </p:nvSpPr>
+        <p:spPr>
+          <a:xfrm>
+            <a:off x="391164" y="1045097"/>
+            <a:ext cx="8229600" cy="4893088"/>
+          </a:xfrm>
+          <a:noFill/>
+          <a:scene3d>
+            <a:camera prst="orthographicFront">
+              <a:rot lat="0" lon="0" rev="0"/>
+            </a:camera>
+            <a:lightRig rig="threePt" dir="t"/>
+          </a:scene3d>
+          <a:sp3d>
+            <a:bevelT w="254000" h="254000" prst="coolSlant"/>
+          </a:sp3d>
+        </p:spPr>
+        <p:txBody>
+          <a:bodyPr>
+            <a:prstTxWarp prst="textArchUp">
+              <a:avLst>
+                <a:gd name="adj" fmla="val 7504620"/>
+              </a:avLst>
+            </a:prstTxWarp>
+            <a:normAutofit/>
+          </a:bodyPr>
+          <a:lstStyle/>
+          <a:p>
+            <a:r>
+              <a:rPr lang="en-US" sz="9600" b="1" dirty="0">
+                <a:ln w="57150" cmpd="sng">
+                  <a:solidFill>
+                    <a:srgbClr val="000090"/>
+                  </a:solidFill>
+                  <a:prstDash val="solid"/>
+                </a:ln>
+                <a:solidFill>
+                  <a:srgbClr val="FFFFFF"/>
+                </a:solidFill>
+                <a:effectLst>
+                  <a:outerShdw blurRad="41275" dist="12700" dir="12000000" algn="tl" rotWithShape="0">
+                    <a:srgbClr val="000000">
+                      <a:alpha val="40000"/>
+                    </a:srgbClr>
+                  </a:outerShdw>
+                </a:effectLst>
+                <a:latin typeface="American Typewriter"/>
+                <a:cs typeface="American Typewriter"/>
+              </a:rPr>
+              <a:t>e</a:t>
+            </a:r>
+            <a:r>
+              <a:rPr lang="en-US" sz="9600" b="1" dirty="0" smtClean="0">
+                <a:ln w="57150" cmpd="sng">
+                  <a:solidFill>
+                    <a:srgbClr val="000090"/>
+                  </a:solidFill>
+                  <a:prstDash val="solid"/>
+                </a:ln>
+                <a:solidFill>
+                  <a:srgbClr val="FFFFFF"/>
+                </a:solidFill>
+                <a:effectLst>
+                  <a:outerShdw blurRad="41275" dist="12700" dir="12000000" algn="tl" rotWithShape="0">
+                    <a:srgbClr val="000000">
+                      <a:alpha val="40000"/>
+                    </a:srgbClr>
+                  </a:outerShdw>
+                </a:effectLst>
+                <a:latin typeface="American Typewriter"/>
+                <a:cs typeface="American Typewriter"/>
+              </a:rPr>
+              <a:t> D o c </a:t>
+            </a:r>
+            <a:r>
+              <a:rPr lang="en-US" sz="9600" b="1" dirty="0" smtClean="0">
+                <a:ln w="76200" cmpd="sng">
+                  <a:noFill/>
+                  <a:prstDash val="sysDash"/>
+                </a:ln>
+                <a:solidFill>
+                  <a:srgbClr val="FFFFFF"/>
+                </a:solidFill>
+                <a:effectLst>
+                  <a:glow rad="101600">
+                    <a:srgbClr val="3366FF">
+                      <a:alpha val="18000"/>
+                    </a:srgbClr>
+                  </a:glow>
+                </a:effectLst>
+                <a:latin typeface="American Typewriter"/>
+                <a:cs typeface="American Typewriter"/>
+              </a:rPr>
+              <a:t>o     e</a:t>
+            </a:r>
+            <a:endParaRPr lang="en-US" sz="9600" b="1" dirty="0">
+              <a:ln w="76200" cmpd="sng">
+                <a:noFill/>
+                <a:prstDash val="sysDash"/>
+              </a:ln>
+              <a:solidFill>
+                <a:srgbClr val="FFFFFF"/>
+              </a:solidFill>
+              <a:effectLst>
+                <a:glow rad="101600">
+                  <a:srgbClr val="3366FF">
+                    <a:alpha val="18000"/>
+                  </a:srgbClr>
+                </a:glow>
+              </a:effectLst>
+              <a:latin typeface="American Typewriter"/>
+              <a:cs typeface="American Typewriter"/>
+            </a:endParaRPr>
+          </a:p>
+        </p:txBody>
+      </p:sp>
       <p:sp>
         <p:nvSpPr>
           <p:cNvPr id="12" name="Rectangle 11"/>
@@ -4229,70 +4167,7 @@
                 <a:latin typeface="American Typewriter"/>
                 <a:cs typeface="American Typewriter"/>
               </a:rPr>
-              <a:t>o </a:t>
-            </a:r>
-            <a:r>
-              <a:rPr lang="en-US" sz="9600" b="1" dirty="0" smtClean="0">
-                <a:ln w="76200" cmpd="sng">
-                  <a:noFill/>
-                  <a:prstDash val="sysDash"/>
-                </a:ln>
-                <a:solidFill>
-                  <a:srgbClr val="FFFFFF"/>
-                </a:solidFill>
-                <a:effectLst>
-                  <a:glow rad="101600">
-                    <a:srgbClr val="3366FF">
-                      <a:alpha val="18000"/>
-                    </a:srgbClr>
-                  </a:glow>
-                </a:effectLst>
-                <a:latin typeface="American Typewriter"/>
-                <a:cs typeface="American Typewriter"/>
-              </a:rPr>
-              <a:t>  </a:t>
-            </a:r>
-            <a:r>
-              <a:rPr lang="en-US" sz="9600" b="1" dirty="0" smtClean="0">
-                <a:ln w="76200" cmpd="sng">
-                  <a:noFill/>
-                  <a:prstDash val="sysDash"/>
-                </a:ln>
-                <a:solidFill>
-                  <a:srgbClr val="FFFFFF"/>
-                </a:solidFill>
-                <a:effectLst>
-                  <a:glow rad="101600">
-                    <a:srgbClr val="3366FF">
-                      <a:alpha val="18000"/>
-                    </a:srgbClr>
-                  </a:glow>
-                </a:effectLst>
-                <a:latin typeface="American Typewriter"/>
-                <a:cs typeface="American Typewriter"/>
-              </a:rPr>
-              <a:t>  </a:t>
-            </a:r>
-            <a:r>
-              <a:rPr lang="en-US" sz="9600" b="1" dirty="0" smtClean="0">
-                <a:ln w="76200" cmpd="sng">
-                  <a:noFill/>
-                  <a:prstDash val="sysDash"/>
-                </a:ln>
-                <a:solidFill>
-                  <a:srgbClr val="FFFFFF"/>
-                </a:solidFill>
-                <a:effectLst>
-                  <a:glow rad="101600">
-                    <a:srgbClr val="3366FF">
-                      <a:alpha val="18000"/>
-                    </a:srgbClr>
-                  </a:glow>
-                </a:effectLst>
-                <a:latin typeface="American Typewriter"/>
-                <a:cs typeface="American Typewriter"/>
-              </a:rPr>
-              <a:t>e</a:t>
+              <a:t>o     e</a:t>
             </a:r>
             <a:endParaRPr lang="en-US" sz="9600" b="1" dirty="0">
               <a:ln w="76200" cmpd="sng">
@@ -5209,70 +5084,7 @@
                 <a:latin typeface="American Typewriter"/>
                 <a:cs typeface="American Typewriter"/>
               </a:rPr>
-              <a:t>o </a:t>
-            </a:r>
-            <a:r>
-              <a:rPr lang="en-US" sz="9600" b="1" dirty="0" smtClean="0">
-                <a:ln w="76200" cmpd="sng">
-                  <a:noFill/>
-                  <a:prstDash val="sysDash"/>
-                </a:ln>
-                <a:solidFill>
-                  <a:srgbClr val="FFFFFF"/>
-                </a:solidFill>
-                <a:effectLst>
-                  <a:glow rad="101600">
-                    <a:srgbClr val="3366FF">
-                      <a:alpha val="18000"/>
-                    </a:srgbClr>
-                  </a:glow>
-                </a:effectLst>
-                <a:latin typeface="American Typewriter"/>
-                <a:cs typeface="American Typewriter"/>
-              </a:rPr>
-              <a:t>  </a:t>
-            </a:r>
-            <a:r>
-              <a:rPr lang="en-US" sz="9600" b="1" dirty="0" smtClean="0">
-                <a:ln w="76200" cmpd="sng">
-                  <a:noFill/>
-                  <a:prstDash val="sysDash"/>
-                </a:ln>
-                <a:solidFill>
-                  <a:srgbClr val="FFFFFF"/>
-                </a:solidFill>
-                <a:effectLst>
-                  <a:glow rad="101600">
-                    <a:srgbClr val="3366FF">
-                      <a:alpha val="18000"/>
-                    </a:srgbClr>
-                  </a:glow>
-                </a:effectLst>
-                <a:latin typeface="American Typewriter"/>
-                <a:cs typeface="American Typewriter"/>
-              </a:rPr>
-              <a:t>  </a:t>
-            </a:r>
-            <a:r>
-              <a:rPr lang="en-US" sz="9600" b="1" dirty="0" smtClean="0">
-                <a:ln w="76200" cmpd="sng">
-                  <a:noFill/>
-                  <a:prstDash val="sysDash"/>
-                </a:ln>
-                <a:solidFill>
-                  <a:srgbClr val="FFFFFF"/>
-                </a:solidFill>
-                <a:effectLst>
-                  <a:glow rad="101600">
-                    <a:srgbClr val="3366FF">
-                      <a:alpha val="18000"/>
-                    </a:srgbClr>
-                  </a:glow>
-                </a:effectLst>
-                <a:latin typeface="American Typewriter"/>
-                <a:cs typeface="American Typewriter"/>
-              </a:rPr>
-              <a:t>e</a:t>
+              <a:t>o     e</a:t>
             </a:r>
             <a:endParaRPr lang="en-US" sz="9600" b="1" dirty="0">
               <a:ln w="76200" cmpd="sng">

</xml_diff>